<commit_message>
Nambahin Code Interface nya Chaniev
</commit_message>
<xml_diff>
--- a/Dokumen/Sistem Informasi.pptx
+++ b/Dokumen/Sistem Informasi.pptx
@@ -13,9 +13,11 @@
     <p:sldId id="260" r:id="rId7"/>
     <p:sldId id="261" r:id="rId8"/>
     <p:sldId id="262" r:id="rId9"/>
-    <p:sldId id="264" r:id="rId10"/>
-    <p:sldId id="265" r:id="rId11"/>
-    <p:sldId id="266" r:id="rId12"/>
+    <p:sldId id="267" r:id="rId10"/>
+    <p:sldId id="264" r:id="rId11"/>
+    <p:sldId id="265" r:id="rId12"/>
+    <p:sldId id="266" r:id="rId13"/>
+    <p:sldId id="268" r:id="rId14"/>
   </p:sldIdLst>
   <p:sldSz cx="9144000" cy="6858000" type="screen4x3"/>
   <p:notesSz cx="6858000" cy="9144000"/>
@@ -3671,6 +3673,119 @@
             <p:ph type="title"/>
           </p:nvPr>
         </p:nvSpPr>
+        <p:spPr/>
+        <p:txBody>
+          <a:bodyPr/>
+          <a:lstStyle/>
+          <a:p>
+            <a:r>
+              <a:rPr lang="en-US" dirty="0" smtClean="0"/>
+              <a:t>Physical Data Model</a:t>
+            </a:r>
+            <a:endParaRPr lang="en-GB" dirty="0"/>
+          </a:p>
+        </p:txBody>
+      </p:sp>
+      <p:sp>
+        <p:nvSpPr>
+          <p:cNvPr id="3" name="Content Placeholder 2"/>
+          <p:cNvSpPr>
+            <a:spLocks noGrp="1"/>
+          </p:cNvSpPr>
+          <p:nvPr>
+            <p:ph idx="1"/>
+          </p:nvPr>
+        </p:nvSpPr>
+        <p:spPr/>
+        <p:txBody>
+          <a:bodyPr/>
+          <a:lstStyle/>
+          <a:p>
+            <a:endParaRPr lang="en-GB" dirty="0"/>
+          </a:p>
+        </p:txBody>
+      </p:sp>
+      <p:pic>
+        <p:nvPicPr>
+          <p:cNvPr id="6146" name="Picture 2" descr="C:\Users\ASUS\Desktop\PDM movie rental.jpg"/>
+          <p:cNvPicPr>
+            <a:picLocks noChangeAspect="1" noChangeArrowheads="1"/>
+          </p:cNvPicPr>
+          <p:nvPr/>
+        </p:nvPicPr>
+        <p:blipFill>
+          <a:blip r:embed="rId2">
+            <a:extLst>
+              <a:ext uri="{28A0092B-C50C-407E-A947-70E740481C1C}">
+                <a14:useLocalDpi xmlns:a14="http://schemas.microsoft.com/office/drawing/2010/main" val="0"/>
+              </a:ext>
+            </a:extLst>
+          </a:blip>
+          <a:srcRect/>
+          <a:stretch>
+            <a:fillRect/>
+          </a:stretch>
+        </p:blipFill>
+        <p:spPr bwMode="auto">
+          <a:xfrm>
+            <a:off x="1219200" y="1447800"/>
+            <a:ext cx="6858000" cy="4772261"/>
+          </a:xfrm>
+          <a:prstGeom prst="rect">
+            <a:avLst/>
+          </a:prstGeom>
+          <a:noFill/>
+          <a:extLst>
+            <a:ext uri="{909E8E84-426E-40DD-AFC4-6F175D3DCCD1}">
+              <a14:hiddenFill xmlns:a14="http://schemas.microsoft.com/office/drawing/2010/main">
+                <a:solidFill>
+                  <a:srgbClr val="FFFFFF"/>
+                </a:solidFill>
+              </a14:hiddenFill>
+            </a:ext>
+          </a:extLst>
+        </p:spPr>
+      </p:pic>
+    </p:spTree>
+    <p:extLst>
+      <p:ext uri="{BB962C8B-B14F-4D97-AF65-F5344CB8AC3E}">
+        <p14:creationId xmlns:p14="http://schemas.microsoft.com/office/powerpoint/2010/main" val="3276102468"/>
+      </p:ext>
+    </p:extLst>
+  </p:cSld>
+  <p:clrMapOvr>
+    <a:masterClrMapping/>
+  </p:clrMapOvr>
+</p:sld>
+</file>
+
+<file path=ppt/slides/slide11.xml><?xml version="1.0" encoding="utf-8"?>
+<p:sld xmlns:a="http://schemas.openxmlformats.org/drawingml/2006/main" xmlns:r="http://schemas.openxmlformats.org/officeDocument/2006/relationships" xmlns:p="http://schemas.openxmlformats.org/presentationml/2006/main">
+  <p:cSld>
+    <p:spTree>
+      <p:nvGrpSpPr>
+        <p:cNvPr id="1" name=""/>
+        <p:cNvGrpSpPr/>
+        <p:nvPr/>
+      </p:nvGrpSpPr>
+      <p:grpSpPr>
+        <a:xfrm>
+          <a:off x="0" y="0"/>
+          <a:ext cx="0" cy="0"/>
+          <a:chOff x="0" y="0"/>
+          <a:chExt cx="0" cy="0"/>
+        </a:xfrm>
+      </p:grpSpPr>
+      <p:sp>
+        <p:nvSpPr>
+          <p:cNvPr id="2" name="Title 1"/>
+          <p:cNvSpPr>
+            <a:spLocks noGrp="1"/>
+          </p:cNvSpPr>
+          <p:nvPr>
+            <p:ph type="title"/>
+          </p:nvPr>
+        </p:nvSpPr>
         <p:spPr>
           <a:xfrm>
             <a:off x="457200" y="228600"/>
@@ -4166,7 +4281,7 @@
 </p:sld>
 </file>
 
-<file path=ppt/slides/slide11.xml><?xml version="1.0" encoding="utf-8"?>
+<file path=ppt/slides/slide12.xml><?xml version="1.0" encoding="utf-8"?>
 <p:sld xmlns:a="http://schemas.openxmlformats.org/drawingml/2006/main" xmlns:r="http://schemas.openxmlformats.org/officeDocument/2006/relationships" xmlns:p="http://schemas.openxmlformats.org/presentationml/2006/main">
   <p:cSld>
     <p:spTree>
@@ -4270,6 +4385,65 @@
     <p:extLst>
       <p:ext uri="{BB962C8B-B14F-4D97-AF65-F5344CB8AC3E}">
         <p14:creationId xmlns:p14="http://schemas.microsoft.com/office/powerpoint/2010/main" val="2643050584"/>
+      </p:ext>
+    </p:extLst>
+  </p:cSld>
+  <p:clrMapOvr>
+    <a:masterClrMapping/>
+  </p:clrMapOvr>
+</p:sld>
+</file>
+
+<file path=ppt/slides/slide13.xml><?xml version="1.0" encoding="utf-8"?>
+<p:sld xmlns:a="http://schemas.openxmlformats.org/drawingml/2006/main" xmlns:r="http://schemas.openxmlformats.org/officeDocument/2006/relationships" xmlns:p="http://schemas.openxmlformats.org/presentationml/2006/main">
+  <p:cSld>
+    <p:spTree>
+      <p:nvGrpSpPr>
+        <p:cNvPr id="1" name=""/>
+        <p:cNvGrpSpPr/>
+        <p:nvPr/>
+      </p:nvGrpSpPr>
+      <p:grpSpPr>
+        <a:xfrm>
+          <a:off x="0" y="0"/>
+          <a:ext cx="0" cy="0"/>
+          <a:chOff x="0" y="0"/>
+          <a:chExt cx="0" cy="0"/>
+        </a:xfrm>
+      </p:grpSpPr>
+      <p:sp>
+        <p:nvSpPr>
+          <p:cNvPr id="2" name="Title 1"/>
+          <p:cNvSpPr>
+            <a:spLocks noGrp="1"/>
+          </p:cNvSpPr>
+          <p:nvPr>
+            <p:ph type="title"/>
+          </p:nvPr>
+        </p:nvSpPr>
+        <p:spPr>
+          <a:xfrm>
+            <a:off x="1600200" y="2514600"/>
+            <a:ext cx="5791200" cy="1371600"/>
+          </a:xfrm>
+        </p:spPr>
+        <p:txBody>
+          <a:bodyPr/>
+          <a:lstStyle/>
+          <a:p>
+            <a:pPr algn="ctr"/>
+            <a:r>
+              <a:rPr lang="en-US" dirty="0" smtClean="0"/>
+              <a:t>TERIMA KASIH….</a:t>
+            </a:r>
+            <a:endParaRPr lang="en-GB" dirty="0"/>
+          </a:p>
+        </p:txBody>
+      </p:sp>
+    </p:spTree>
+    <p:extLst>
+      <p:ext uri="{BB962C8B-B14F-4D97-AF65-F5344CB8AC3E}">
+        <p14:creationId xmlns:p14="http://schemas.microsoft.com/office/powerpoint/2010/main" val="1238404676"/>
       </p:ext>
     </p:extLst>
   </p:cSld>
@@ -5480,7 +5654,7 @@
           <a:p>
             <a:r>
               <a:rPr lang="en-US" dirty="0" smtClean="0"/>
-              <a:t>Physical Data Model</a:t>
+              <a:t>MASALAH YANG MUNGKIN DIHADAPI</a:t>
             </a:r>
             <a:endParaRPr lang="en-GB" dirty="0"/>
           </a:p>
@@ -5501,55 +5675,107 @@
           <a:bodyPr/>
           <a:lstStyle/>
           <a:p>
+            <a:pPr marL="342900" indent="-342900">
+              <a:buFont typeface="Arial" pitchFamily="34" charset="0"/>
+              <a:buChar char="•"/>
+            </a:pPr>
+            <a:r>
+              <a:rPr lang="en-US" dirty="0" err="1" smtClean="0"/>
+              <a:t>Perubahan</a:t>
+            </a:r>
+            <a:r>
+              <a:rPr lang="en-US" dirty="0" smtClean="0"/>
+              <a:t> </a:t>
+            </a:r>
+            <a:r>
+              <a:rPr lang="en-US" dirty="0" err="1" smtClean="0"/>
+              <a:t>pada</a:t>
+            </a:r>
+            <a:r>
+              <a:rPr lang="en-US" dirty="0" smtClean="0"/>
+              <a:t> database </a:t>
+            </a:r>
+            <a:r>
+              <a:rPr lang="en-US" dirty="0" err="1" smtClean="0"/>
+              <a:t>dan</a:t>
+            </a:r>
+            <a:r>
+              <a:rPr lang="en-US" dirty="0" smtClean="0"/>
+              <a:t> </a:t>
+            </a:r>
+            <a:r>
+              <a:rPr lang="en-US" dirty="0" err="1" smtClean="0"/>
+              <a:t>memperngaruhi</a:t>
+            </a:r>
+            <a:r>
+              <a:rPr lang="en-US" dirty="0" smtClean="0"/>
+              <a:t> </a:t>
+            </a:r>
+            <a:r>
+              <a:rPr lang="en-US" dirty="0" err="1" smtClean="0"/>
+              <a:t>implementasi</a:t>
+            </a:r>
+            <a:endParaRPr lang="en-US" dirty="0" smtClean="0"/>
+          </a:p>
+          <a:p>
+            <a:pPr marL="342900" indent="-342900">
+              <a:buFont typeface="Arial" pitchFamily="34" charset="0"/>
+              <a:buChar char="•"/>
+            </a:pPr>
+            <a:r>
+              <a:rPr lang="en-US" dirty="0" err="1" smtClean="0"/>
+              <a:t>Kurangnya</a:t>
+            </a:r>
+            <a:r>
+              <a:rPr lang="en-US" dirty="0" smtClean="0"/>
+              <a:t> </a:t>
+            </a:r>
+            <a:r>
+              <a:rPr lang="en-US" dirty="0" err="1" smtClean="0"/>
+              <a:t>waktu</a:t>
+            </a:r>
+            <a:r>
+              <a:rPr lang="en-US" dirty="0"/>
+              <a:t> </a:t>
+            </a:r>
+            <a:r>
+              <a:rPr lang="en-US" dirty="0" err="1" smtClean="0"/>
+              <a:t>dalam</a:t>
+            </a:r>
+            <a:r>
+              <a:rPr lang="en-US" dirty="0" smtClean="0"/>
+              <a:t> </a:t>
+            </a:r>
+            <a:r>
+              <a:rPr lang="en-US" dirty="0" err="1" smtClean="0"/>
+              <a:t>implementasi</a:t>
+            </a:r>
+            <a:endParaRPr lang="en-US" dirty="0" smtClean="0"/>
+          </a:p>
+          <a:p>
+            <a:pPr marL="342900" indent="-342900">
+              <a:buFont typeface="Arial" pitchFamily="34" charset="0"/>
+              <a:buChar char="•"/>
+            </a:pPr>
+            <a:r>
+              <a:rPr lang="en-US" dirty="0" err="1" smtClean="0"/>
+              <a:t>dll</a:t>
+            </a:r>
+            <a:endParaRPr lang="en-US" dirty="0" smtClean="0"/>
+          </a:p>
+          <a:p>
+            <a:pPr marL="342900" indent="-342900">
+              <a:buFont typeface="Arial" pitchFamily="34" charset="0"/>
+              <a:buChar char="•"/>
+            </a:pPr>
             <a:endParaRPr lang="en-GB" dirty="0"/>
           </a:p>
         </p:txBody>
       </p:sp>
-      <p:pic>
-        <p:nvPicPr>
-          <p:cNvPr id="6146" name="Picture 2" descr="C:\Users\ASUS\Desktop\PDM movie rental.jpg"/>
-          <p:cNvPicPr>
-            <a:picLocks noChangeAspect="1" noChangeArrowheads="1"/>
-          </p:cNvPicPr>
-          <p:nvPr/>
-        </p:nvPicPr>
-        <p:blipFill>
-          <a:blip r:embed="rId2">
-            <a:extLst>
-              <a:ext uri="{28A0092B-C50C-407E-A947-70E740481C1C}">
-                <a14:useLocalDpi xmlns:a14="http://schemas.microsoft.com/office/drawing/2010/main" val="0"/>
-              </a:ext>
-            </a:extLst>
-          </a:blip>
-          <a:srcRect/>
-          <a:stretch>
-            <a:fillRect/>
-          </a:stretch>
-        </p:blipFill>
-        <p:spPr bwMode="auto">
-          <a:xfrm>
-            <a:off x="1219200" y="1447800"/>
-            <a:ext cx="6858000" cy="4772261"/>
-          </a:xfrm>
-          <a:prstGeom prst="rect">
-            <a:avLst/>
-          </a:prstGeom>
-          <a:noFill/>
-          <a:extLst>
-            <a:ext uri="{909E8E84-426E-40DD-AFC4-6F175D3DCCD1}">
-              <a14:hiddenFill xmlns:a14="http://schemas.microsoft.com/office/drawing/2010/main">
-                <a:solidFill>
-                  <a:srgbClr val="FFFFFF"/>
-                </a:solidFill>
-              </a14:hiddenFill>
-            </a:ext>
-          </a:extLst>
-        </p:spPr>
-      </p:pic>
     </p:spTree>
     <p:extLst>
       <p:ext uri="{BB962C8B-B14F-4D97-AF65-F5344CB8AC3E}">
-        <p14:creationId xmlns:p14="http://schemas.microsoft.com/office/powerpoint/2010/main" val="3276102468"/>
+        <p14:creationId xmlns:p14="http://schemas.microsoft.com/office/powerpoint/2010/main" val="4130874697"/>
       </p:ext>
     </p:extLst>
   </p:cSld>

</xml_diff>